<commit_message>
Changing from job-aids to Deliverables
</commit_message>
<xml_diff>
--- a/media/orrigionals/library_content.pptx
+++ b/media/orrigionals/library_content.pptx
@@ -318,7 +318,7 @@
           <a:p>
             <a:fld id="{7E7C3749-03C6-44B9-B002-9F213752FFB0}" type="datetimeFigureOut">
               <a:rPr lang="en-AU" smtClean="0"/>
-              <a:t>26/04/2013</a:t>
+              <a:t>23/05/2013</a:t>
             </a:fld>
             <a:endParaRPr lang="en-AU"/>
           </a:p>
@@ -507,7 +507,7 @@
           <a:p>
             <a:fld id="{7E7C3749-03C6-44B9-B002-9F213752FFB0}" type="datetimeFigureOut">
               <a:rPr lang="en-AU" smtClean="0"/>
-              <a:t>26/04/2013</a:t>
+              <a:t>23/05/2013</a:t>
             </a:fld>
             <a:endParaRPr lang="en-AU"/>
           </a:p>
@@ -706,7 +706,7 @@
           <a:p>
             <a:fld id="{7E7C3749-03C6-44B9-B002-9F213752FFB0}" type="datetimeFigureOut">
               <a:rPr lang="en-AU" smtClean="0"/>
-              <a:t>26/04/2013</a:t>
+              <a:t>23/05/2013</a:t>
             </a:fld>
             <a:endParaRPr lang="en-AU"/>
           </a:p>
@@ -895,7 +895,7 @@
           <a:p>
             <a:fld id="{7E7C3749-03C6-44B9-B002-9F213752FFB0}" type="datetimeFigureOut">
               <a:rPr lang="en-AU" smtClean="0"/>
-              <a:t>26/04/2013</a:t>
+              <a:t>23/05/2013</a:t>
             </a:fld>
             <a:endParaRPr lang="en-AU"/>
           </a:p>
@@ -1165,7 +1165,7 @@
           <a:p>
             <a:fld id="{7E7C3749-03C6-44B9-B002-9F213752FFB0}" type="datetimeFigureOut">
               <a:rPr lang="en-AU" smtClean="0"/>
-              <a:t>26/04/2013</a:t>
+              <a:t>23/05/2013</a:t>
             </a:fld>
             <a:endParaRPr lang="en-AU"/>
           </a:p>
@@ -1279,7 +1279,7 @@
           <a:p>
             <a:fld id="{7E7C3749-03C6-44B9-B002-9F213752FFB0}" type="datetimeFigureOut">
               <a:rPr lang="en-AU" smtClean="0"/>
-              <a:t>26/04/2013</a:t>
+              <a:t>23/05/2013</a:t>
             </a:fld>
             <a:endParaRPr lang="en-AU"/>
           </a:p>
@@ -1677,7 +1677,7 @@
           <a:p>
             <a:fld id="{7E7C3749-03C6-44B9-B002-9F213752FFB0}" type="datetimeFigureOut">
               <a:rPr lang="en-AU" smtClean="0"/>
-              <a:t>26/04/2013</a:t>
+              <a:t>23/05/2013</a:t>
             </a:fld>
             <a:endParaRPr lang="en-AU"/>
           </a:p>
@@ -1956,7 +1956,7 @@
           <a:p>
             <a:fld id="{7E7C3749-03C6-44B9-B002-9F213752FFB0}" type="datetimeFigureOut">
               <a:rPr lang="en-AU" smtClean="0"/>
-              <a:t>26/04/2013</a:t>
+              <a:t>23/05/2013</a:t>
             </a:fld>
             <a:endParaRPr lang="en-AU"/>
           </a:p>
@@ -2070,7 +2070,7 @@
           <a:p>
             <a:fld id="{7E7C3749-03C6-44B9-B002-9F213752FFB0}" type="datetimeFigureOut">
               <a:rPr lang="en-AU" smtClean="0"/>
-              <a:t>26/04/2013</a:t>
+              <a:t>23/05/2013</a:t>
             </a:fld>
             <a:endParaRPr lang="en-AU"/>
           </a:p>
@@ -2368,7 +2368,7 @@
           <a:p>
             <a:fld id="{7E7C3749-03C6-44B9-B002-9F213752FFB0}" type="datetimeFigureOut">
               <a:rPr lang="en-AU" smtClean="0"/>
-              <a:t>26/04/2013</a:t>
+              <a:t>23/05/2013</a:t>
             </a:fld>
             <a:endParaRPr lang="en-AU"/>
           </a:p>
@@ -2664,7 +2664,7 @@
           <a:p>
             <a:fld id="{7E7C3749-03C6-44B9-B002-9F213752FFB0}" type="datetimeFigureOut">
               <a:rPr lang="en-AU" smtClean="0"/>
-              <a:t>26/04/2013</a:t>
+              <a:t>23/05/2013</a:t>
             </a:fld>
             <a:endParaRPr lang="en-AU"/>
           </a:p>
@@ -3230,7 +3230,7 @@
         </p:nvGrpSpPr>
         <p:grpSpPr>
           <a:xfrm>
-            <a:off x="611560" y="488651"/>
+            <a:off x="611560" y="476672"/>
             <a:ext cx="7704855" cy="5964685"/>
             <a:chOff x="611560" y="488651"/>
             <a:chExt cx="7704855" cy="5964685"/>
@@ -3483,7 +3483,7 @@
               <a:pPr algn="ctr"/>
               <a:r>
                 <a:rPr lang="en-AU" dirty="0" smtClean="0"/>
-                <a:t>Job aids</a:t>
+                <a:t>Deliverables</a:t>
               </a:r>
               <a:endParaRPr lang="en-AU" dirty="0" smtClean="0"/>
             </a:p>

</xml_diff>